<commit_message>
Update image understand causality time
</commit_message>
<xml_diff>
--- a/demo/powerpoint/demo_maat_transfo_within.pptx
+++ b/demo/powerpoint/demo_maat_transfo_within.pptx
@@ -243,7 +243,7 @@
           <a:p>
             <a:fld id="{A0946C66-99AB-4BAB-B3CF-7EF1A62EDD51}" type="datetimeFigureOut">
               <a:rPr lang="fr-FR" smtClean="0"/>
-              <a:t>26/10/2022</a:t>
+              <a:t>27/10/2022</a:t>
             </a:fld>
             <a:endParaRPr lang="fr-FR"/>
           </a:p>
@@ -413,7 +413,7 @@
           <a:p>
             <a:fld id="{A0946C66-99AB-4BAB-B3CF-7EF1A62EDD51}" type="datetimeFigureOut">
               <a:rPr lang="fr-FR" smtClean="0"/>
-              <a:t>26/10/2022</a:t>
+              <a:t>27/10/2022</a:t>
             </a:fld>
             <a:endParaRPr lang="fr-FR"/>
           </a:p>
@@ -593,7 +593,7 @@
           <a:p>
             <a:fld id="{A0946C66-99AB-4BAB-B3CF-7EF1A62EDD51}" type="datetimeFigureOut">
               <a:rPr lang="fr-FR" smtClean="0"/>
-              <a:t>26/10/2022</a:t>
+              <a:t>27/10/2022</a:t>
             </a:fld>
             <a:endParaRPr lang="fr-FR"/>
           </a:p>
@@ -763,7 +763,7 @@
           <a:p>
             <a:fld id="{A0946C66-99AB-4BAB-B3CF-7EF1A62EDD51}" type="datetimeFigureOut">
               <a:rPr lang="fr-FR" smtClean="0"/>
-              <a:t>26/10/2022</a:t>
+              <a:t>27/10/2022</a:t>
             </a:fld>
             <a:endParaRPr lang="fr-FR"/>
           </a:p>
@@ -1009,7 +1009,7 @@
           <a:p>
             <a:fld id="{A0946C66-99AB-4BAB-B3CF-7EF1A62EDD51}" type="datetimeFigureOut">
               <a:rPr lang="fr-FR" smtClean="0"/>
-              <a:t>26/10/2022</a:t>
+              <a:t>27/10/2022</a:t>
             </a:fld>
             <a:endParaRPr lang="fr-FR"/>
           </a:p>
@@ -1241,7 +1241,7 @@
           <a:p>
             <a:fld id="{A0946C66-99AB-4BAB-B3CF-7EF1A62EDD51}" type="datetimeFigureOut">
               <a:rPr lang="fr-FR" smtClean="0"/>
-              <a:t>26/10/2022</a:t>
+              <a:t>27/10/2022</a:t>
             </a:fld>
             <a:endParaRPr lang="fr-FR"/>
           </a:p>
@@ -1608,7 +1608,7 @@
           <a:p>
             <a:fld id="{A0946C66-99AB-4BAB-B3CF-7EF1A62EDD51}" type="datetimeFigureOut">
               <a:rPr lang="fr-FR" smtClean="0"/>
-              <a:t>26/10/2022</a:t>
+              <a:t>27/10/2022</a:t>
             </a:fld>
             <a:endParaRPr lang="fr-FR"/>
           </a:p>
@@ -1726,7 +1726,7 @@
           <a:p>
             <a:fld id="{A0946C66-99AB-4BAB-B3CF-7EF1A62EDD51}" type="datetimeFigureOut">
               <a:rPr lang="fr-FR" smtClean="0"/>
-              <a:t>26/10/2022</a:t>
+              <a:t>27/10/2022</a:t>
             </a:fld>
             <a:endParaRPr lang="fr-FR"/>
           </a:p>
@@ -1821,7 +1821,7 @@
           <a:p>
             <a:fld id="{A0946C66-99AB-4BAB-B3CF-7EF1A62EDD51}" type="datetimeFigureOut">
               <a:rPr lang="fr-FR" smtClean="0"/>
-              <a:t>26/10/2022</a:t>
+              <a:t>27/10/2022</a:t>
             </a:fld>
             <a:endParaRPr lang="fr-FR"/>
           </a:p>
@@ -2098,7 +2098,7 @@
           <a:p>
             <a:fld id="{A0946C66-99AB-4BAB-B3CF-7EF1A62EDD51}" type="datetimeFigureOut">
               <a:rPr lang="fr-FR" smtClean="0"/>
-              <a:t>26/10/2022</a:t>
+              <a:t>27/10/2022</a:t>
             </a:fld>
             <a:endParaRPr lang="fr-FR"/>
           </a:p>
@@ -2351,7 +2351,7 @@
           <a:p>
             <a:fld id="{A0946C66-99AB-4BAB-B3CF-7EF1A62EDD51}" type="datetimeFigureOut">
               <a:rPr lang="fr-FR" smtClean="0"/>
-              <a:t>26/10/2022</a:t>
+              <a:t>27/10/2022</a:t>
             </a:fld>
             <a:endParaRPr lang="fr-FR"/>
           </a:p>
@@ -2564,7 +2564,7 @@
           <a:p>
             <a:fld id="{A0946C66-99AB-4BAB-B3CF-7EF1A62EDD51}" type="datetimeFigureOut">
               <a:rPr lang="fr-FR" smtClean="0"/>
-              <a:t>26/10/2022</a:t>
+              <a:t>27/10/2022</a:t>
             </a:fld>
             <a:endParaRPr lang="fr-FR"/>
           </a:p>
@@ -2984,7 +2984,7 @@
             <a:avLst/>
           </a:prstGeom>
           <a:noFill/>
-          <a:ln w="28575">
+          <a:ln w="3175">
             <a:solidFill>
               <a:srgbClr val="92D050"/>
             </a:solidFill>
@@ -3391,82 +3391,6 @@
           </a:p>
         </p:txBody>
       </p:sp>
-      <p:cxnSp>
-        <p:nvCxnSpPr>
-          <p:cNvPr id="13" name="Connecteur droit 12"/>
-          <p:cNvCxnSpPr/>
-          <p:nvPr/>
-        </p:nvCxnSpPr>
-        <p:spPr>
-          <a:xfrm>
-            <a:off x="2847572" y="5303435"/>
-            <a:ext cx="0" cy="380451"/>
-          </a:xfrm>
-          <a:prstGeom prst="line">
-            <a:avLst/>
-          </a:prstGeom>
-          <a:noFill/>
-          <a:ln w="3175">
-            <a:solidFill>
-              <a:srgbClr val="92D050"/>
-            </a:solidFill>
-          </a:ln>
-        </p:spPr>
-        <p:style>
-          <a:lnRef idx="2">
-            <a:schemeClr val="accent1">
-              <a:shade val="50000"/>
-            </a:schemeClr>
-          </a:lnRef>
-          <a:fillRef idx="1">
-            <a:schemeClr val="accent1"/>
-          </a:fillRef>
-          <a:effectRef idx="0">
-            <a:schemeClr val="accent1"/>
-          </a:effectRef>
-          <a:fontRef idx="minor">
-            <a:schemeClr val="lt1"/>
-          </a:fontRef>
-        </p:style>
-      </p:cxnSp>
-      <p:cxnSp>
-        <p:nvCxnSpPr>
-          <p:cNvPr id="14" name="Connecteur droit 13"/>
-          <p:cNvCxnSpPr/>
-          <p:nvPr/>
-        </p:nvCxnSpPr>
-        <p:spPr>
-          <a:xfrm>
-            <a:off x="4328258" y="5303435"/>
-            <a:ext cx="0" cy="380451"/>
-          </a:xfrm>
-          <a:prstGeom prst="line">
-            <a:avLst/>
-          </a:prstGeom>
-          <a:noFill/>
-          <a:ln w="3175">
-            <a:solidFill>
-              <a:srgbClr val="92D050"/>
-            </a:solidFill>
-          </a:ln>
-        </p:spPr>
-        <p:style>
-          <a:lnRef idx="2">
-            <a:schemeClr val="accent1">
-              <a:shade val="50000"/>
-            </a:schemeClr>
-          </a:lnRef>
-          <a:fillRef idx="1">
-            <a:schemeClr val="accent1"/>
-          </a:fillRef>
-          <a:effectRef idx="0">
-            <a:schemeClr val="accent1"/>
-          </a:effectRef>
-          <a:fontRef idx="minor">
-            <a:schemeClr val="lt1"/>
-          </a:fontRef>
-        </p:style>
-      </p:cxnSp>
       <p:sp>
         <p:nvSpPr>
           <p:cNvPr id="15" name="Rectangle 14"/>
@@ -3582,7 +3506,7 @@
             <a:avLst/>
           </a:prstGeom>
           <a:noFill/>
-          <a:ln w="28575">
+          <a:ln w="3175">
             <a:solidFill>
               <a:srgbClr val="92D050"/>
             </a:solidFill>
@@ -3871,7 +3795,7 @@
             <a:avLst/>
           </a:prstGeom>
           <a:noFill/>
-          <a:ln w="28575">
+          <a:ln w="3175">
             <a:solidFill>
               <a:srgbClr val="92D050"/>
             </a:solidFill>
@@ -3909,7 +3833,7 @@
             <a:avLst/>
           </a:prstGeom>
           <a:noFill/>
-          <a:ln w="28575">
+          <a:ln w="3175">
             <a:solidFill>
               <a:srgbClr val="92D050"/>
             </a:solidFill>
@@ -3940,7 +3864,7 @@
         </p:nvSpPr>
         <p:spPr>
           <a:xfrm>
-            <a:off x="2235155" y="2403301"/>
+            <a:off x="2252338" y="2469183"/>
             <a:ext cx="801823" cy="369332"/>
           </a:xfrm>
           <a:prstGeom prst="rect">
@@ -3974,7 +3898,7 @@
         </p:nvSpPr>
         <p:spPr>
           <a:xfrm>
-            <a:off x="3713837" y="2403301"/>
+            <a:off x="3694487" y="2462518"/>
             <a:ext cx="843693" cy="369332"/>
           </a:xfrm>
           <a:prstGeom prst="rect">
@@ -4291,6 +4215,672 @@
             <a:avLst/>
           </a:prstGeom>
           <a:noFill/>
+          <a:ln w="3175">
+            <a:solidFill>
+              <a:srgbClr val="92D050"/>
+            </a:solidFill>
+          </a:ln>
+        </p:spPr>
+        <p:style>
+          <a:lnRef idx="2">
+            <a:schemeClr val="accent1">
+              <a:shade val="50000"/>
+            </a:schemeClr>
+          </a:lnRef>
+          <a:fillRef idx="1">
+            <a:schemeClr val="accent1"/>
+          </a:fillRef>
+          <a:effectRef idx="0">
+            <a:schemeClr val="accent1"/>
+          </a:effectRef>
+          <a:fontRef idx="minor">
+            <a:schemeClr val="lt1"/>
+          </a:fontRef>
+        </p:style>
+      </p:cxnSp>
+      <p:sp>
+        <p:nvSpPr>
+          <p:cNvPr id="40" name="Rectangle 39"/>
+          <p:cNvSpPr/>
+          <p:nvPr/>
+        </p:nvSpPr>
+        <p:spPr>
+          <a:xfrm>
+            <a:off x="4739700" y="2440372"/>
+            <a:ext cx="801823" cy="369332"/>
+          </a:xfrm>
+          <a:prstGeom prst="rect">
+            <a:avLst/>
+          </a:prstGeom>
+        </p:spPr>
+        <p:txBody>
+          <a:bodyPr wrap="none">
+            <a:spAutoFit/>
+          </a:bodyPr>
+          <a:lstStyle/>
+          <a:p>
+            <a:r>
+              <a:rPr lang="fr-FR" dirty="0" err="1" smtClean="0"/>
+              <a:t>action</a:t>
+            </a:r>
+            <a:r>
+              <a:rPr lang="fr-FR" baseline="-25000" dirty="0" err="1" smtClean="0"/>
+              <a:t>j</a:t>
+            </a:r>
+            <a:endParaRPr lang="fr-FR" dirty="0"/>
+          </a:p>
+        </p:txBody>
+      </p:sp>
+      <p:cxnSp>
+        <p:nvCxnSpPr>
+          <p:cNvPr id="36" name="Connecteur droit 35"/>
+          <p:cNvCxnSpPr/>
+          <p:nvPr/>
+        </p:nvCxnSpPr>
+        <p:spPr>
+          <a:xfrm>
+            <a:off x="8188144" y="5290950"/>
+            <a:ext cx="0" cy="380451"/>
+          </a:xfrm>
+          <a:prstGeom prst="line">
+            <a:avLst/>
+          </a:prstGeom>
+          <a:noFill/>
+          <a:ln w="3175">
+            <a:solidFill>
+              <a:srgbClr val="92D050"/>
+            </a:solidFill>
+          </a:ln>
+        </p:spPr>
+        <p:style>
+          <a:lnRef idx="2">
+            <a:schemeClr val="accent1">
+              <a:shade val="50000"/>
+            </a:schemeClr>
+          </a:lnRef>
+          <a:fillRef idx="1">
+            <a:schemeClr val="accent1"/>
+          </a:fillRef>
+          <a:effectRef idx="0">
+            <a:schemeClr val="accent1"/>
+          </a:effectRef>
+          <a:fontRef idx="minor">
+            <a:schemeClr val="lt1"/>
+          </a:fontRef>
+        </p:style>
+      </p:cxnSp>
+      <p:grpSp>
+        <p:nvGrpSpPr>
+          <p:cNvPr id="37" name="Groupe 36"/>
+          <p:cNvGrpSpPr/>
+          <p:nvPr/>
+        </p:nvGrpSpPr>
+        <p:grpSpPr>
+          <a:xfrm>
+            <a:off x="7314996" y="3373695"/>
+            <a:ext cx="3580802" cy="1435510"/>
+            <a:chOff x="1292941" y="1154046"/>
+            <a:chExt cx="2567873" cy="1298480"/>
+          </a:xfrm>
+        </p:grpSpPr>
+        <p:sp>
+          <p:nvSpPr>
+            <p:cNvPr id="38" name="Rectangle 37"/>
+            <p:cNvSpPr/>
+            <p:nvPr/>
+          </p:nvSpPr>
+          <p:spPr>
+            <a:xfrm>
+              <a:off x="1292941" y="1523378"/>
+              <a:ext cx="1949246" cy="929148"/>
+            </a:xfrm>
+            <a:prstGeom prst="rect">
+              <a:avLst/>
+            </a:prstGeom>
+            <a:ln/>
+          </p:spPr>
+          <p:style>
+            <a:lnRef idx="1">
+              <a:schemeClr val="accent6"/>
+            </a:lnRef>
+            <a:fillRef idx="2">
+              <a:schemeClr val="accent6"/>
+            </a:fillRef>
+            <a:effectRef idx="1">
+              <a:schemeClr val="accent6"/>
+            </a:effectRef>
+            <a:fontRef idx="minor">
+              <a:schemeClr val="dk1"/>
+            </a:fontRef>
+          </p:style>
+          <p:txBody>
+            <a:bodyPr rtlCol="0" anchor="ctr"/>
+            <a:lstStyle/>
+            <a:p>
+              <a:pPr algn="ctr"/>
+              <a:r>
+                <a:rPr lang="fr-FR" sz="1600" b="1" dirty="0" err="1">
+                  <a:solidFill>
+                    <a:schemeClr val="tx1"/>
+                  </a:solidFill>
+                </a:rPr>
+                <a:t>w</a:t>
+              </a:r>
+              <a:r>
+                <a:rPr lang="fr-FR" sz="1600" b="1" dirty="0" err="1" smtClean="0">
+                  <a:solidFill>
+                    <a:schemeClr val="tx1"/>
+                  </a:solidFill>
+                </a:rPr>
+                <a:t>hen</a:t>
+              </a:r>
+              <a:r>
+                <a:rPr lang="fr-FR" sz="1600" b="1" dirty="0" smtClean="0">
+                  <a:solidFill>
+                    <a:schemeClr val="tx1"/>
+                  </a:solidFill>
+                </a:rPr>
+                <a:t> </a:t>
+              </a:r>
+              <a:r>
+                <a:rPr lang="fr-FR" sz="1600" dirty="0" err="1" smtClean="0">
+                  <a:solidFill>
+                    <a:schemeClr val="tx1"/>
+                  </a:solidFill>
+                </a:rPr>
+                <a:t>trigger</a:t>
+              </a:r>
+              <a:r>
+                <a:rPr lang="fr-FR" sz="1600" baseline="-25000" dirty="0" err="1" smtClean="0">
+                  <a:solidFill>
+                    <a:schemeClr val="tx1"/>
+                  </a:solidFill>
+                </a:rPr>
+                <a:t>j</a:t>
+              </a:r>
+              <a:r>
+                <a:rPr lang="fr-FR" sz="1600" dirty="0" smtClean="0">
+                  <a:solidFill>
+                    <a:schemeClr val="tx1"/>
+                  </a:solidFill>
+                </a:rPr>
+                <a:t> </a:t>
+              </a:r>
+            </a:p>
+            <a:p>
+              <a:pPr algn="ctr"/>
+              <a:r>
+                <a:rPr lang="fr-FR" sz="1600" b="1" dirty="0" err="1">
+                  <a:solidFill>
+                    <a:schemeClr val="tx1"/>
+                  </a:solidFill>
+                </a:rPr>
+                <a:t>within</a:t>
+              </a:r>
+              <a:r>
+                <a:rPr lang="fr-FR" sz="1600" dirty="0">
+                  <a:solidFill>
+                    <a:schemeClr val="tx1"/>
+                  </a:solidFill>
+                </a:rPr>
+                <a:t> d</a:t>
+              </a:r>
+              <a:r>
+                <a:rPr lang="fr-FR" sz="1600" baseline="-25000" dirty="0">
+                  <a:solidFill>
+                    <a:schemeClr val="tx1"/>
+                  </a:solidFill>
+                </a:rPr>
+                <a:t>1</a:t>
+              </a:r>
+              <a:r>
+                <a:rPr lang="fr-FR" sz="1600" dirty="0">
+                  <a:solidFill>
+                    <a:schemeClr val="tx1"/>
+                  </a:solidFill>
+                </a:rPr>
+                <a:t> </a:t>
+              </a:r>
+              <a:r>
+                <a:rPr lang="fr-FR" sz="1600" b="1" dirty="0">
+                  <a:solidFill>
+                    <a:schemeClr val="tx1"/>
+                  </a:solidFill>
+                </a:rPr>
+                <a:t>to</a:t>
+              </a:r>
+              <a:r>
+                <a:rPr lang="fr-FR" sz="1600" dirty="0">
+                  <a:solidFill>
+                    <a:schemeClr val="tx1"/>
+                  </a:solidFill>
+                </a:rPr>
+                <a:t> d</a:t>
+              </a:r>
+              <a:r>
+                <a:rPr lang="fr-FR" sz="1600" baseline="-25000" dirty="0">
+                  <a:solidFill>
+                    <a:schemeClr val="tx1"/>
+                  </a:solidFill>
+                </a:rPr>
+                <a:t>2</a:t>
+              </a:r>
+              <a:endParaRPr lang="fr-FR" sz="1600" b="1" dirty="0" smtClean="0">
+                <a:solidFill>
+                  <a:schemeClr val="tx1"/>
+                </a:solidFill>
+              </a:endParaRPr>
+            </a:p>
+            <a:p>
+              <a:pPr algn="ctr"/>
+              <a:r>
+                <a:rPr lang="fr-FR" sz="1600" b="1" dirty="0" err="1" smtClean="0">
+                  <a:solidFill>
+                    <a:schemeClr val="tx1"/>
+                  </a:solidFill>
+                </a:rPr>
+                <a:t>upon</a:t>
+              </a:r>
+              <a:r>
+                <a:rPr lang="fr-FR" sz="1600" dirty="0" smtClean="0">
+                  <a:solidFill>
+                    <a:schemeClr val="tx1"/>
+                  </a:solidFill>
+                </a:rPr>
+                <a:t> </a:t>
+              </a:r>
+              <a:r>
+                <a:rPr lang="fr-FR" sz="1600" dirty="0" err="1" smtClean="0">
+                  <a:solidFill>
+                    <a:schemeClr val="tx1"/>
+                  </a:solidFill>
+                </a:rPr>
+                <a:t>action</a:t>
+              </a:r>
+              <a:r>
+                <a:rPr lang="fr-FR" sz="1600" baseline="-25000" dirty="0" err="1" smtClean="0">
+                  <a:solidFill>
+                    <a:schemeClr val="tx1"/>
+                  </a:solidFill>
+                </a:rPr>
+                <a:t>i</a:t>
+              </a:r>
+              <a:endParaRPr lang="fr-FR" sz="1600" baseline="-25000" dirty="0" smtClean="0">
+                <a:solidFill>
+                  <a:schemeClr val="tx1"/>
+                </a:solidFill>
+              </a:endParaRPr>
+            </a:p>
+          </p:txBody>
+        </p:sp>
+        <p:sp>
+          <p:nvSpPr>
+            <p:cNvPr id="41" name="Rectangle 40"/>
+            <p:cNvSpPr/>
+            <p:nvPr/>
+          </p:nvSpPr>
+          <p:spPr>
+            <a:xfrm>
+              <a:off x="3242186" y="1523378"/>
+              <a:ext cx="618628" cy="929148"/>
+            </a:xfrm>
+            <a:prstGeom prst="rect">
+              <a:avLst/>
+            </a:prstGeom>
+            <a:noFill/>
+            <a:ln w="3175">
+              <a:solidFill>
+                <a:srgbClr val="92D050"/>
+              </a:solidFill>
+            </a:ln>
+          </p:spPr>
+          <p:style>
+            <a:lnRef idx="2">
+              <a:schemeClr val="accent1">
+                <a:shade val="50000"/>
+              </a:schemeClr>
+            </a:lnRef>
+            <a:fillRef idx="1">
+              <a:schemeClr val="accent1"/>
+            </a:fillRef>
+            <a:effectRef idx="0">
+              <a:schemeClr val="accent1"/>
+            </a:effectRef>
+            <a:fontRef idx="minor">
+              <a:schemeClr val="lt1"/>
+            </a:fontRef>
+          </p:style>
+          <p:txBody>
+            <a:bodyPr rtlCol="0" anchor="ctr"/>
+            <a:lstStyle/>
+            <a:p>
+              <a:pPr algn="ctr"/>
+              <a:r>
+                <a:rPr lang="fr-FR" sz="1600" dirty="0" smtClean="0">
+                  <a:solidFill>
+                    <a:schemeClr val="tx1"/>
+                  </a:solidFill>
+                </a:rPr>
+                <a:t>…</a:t>
+              </a:r>
+              <a:endParaRPr lang="fr-FR" baseline="-25000" dirty="0">
+                <a:solidFill>
+                  <a:schemeClr val="tx1"/>
+                </a:solidFill>
+              </a:endParaRPr>
+            </a:p>
+          </p:txBody>
+        </p:sp>
+        <p:sp>
+          <p:nvSpPr>
+            <p:cNvPr id="42" name="ZoneTexte 41"/>
+            <p:cNvSpPr txBox="1"/>
+            <p:nvPr/>
+          </p:nvSpPr>
+          <p:spPr>
+            <a:xfrm>
+              <a:off x="1292941" y="1154046"/>
+              <a:ext cx="235887" cy="306237"/>
+            </a:xfrm>
+            <a:prstGeom prst="rect">
+              <a:avLst/>
+            </a:prstGeom>
+            <a:noFill/>
+            <a:ln w="3175">
+              <a:noFill/>
+            </a:ln>
+          </p:spPr>
+          <p:txBody>
+            <a:bodyPr wrap="none" rtlCol="0">
+              <a:spAutoFit/>
+            </a:bodyPr>
+            <a:lstStyle/>
+            <a:p>
+              <a:r>
+                <a:rPr lang="fr-FR" sz="1600" dirty="0" smtClean="0"/>
+                <a:t>R</a:t>
+              </a:r>
+              <a:r>
+                <a:rPr lang="fr-FR" sz="1600" baseline="-25000" dirty="0" smtClean="0"/>
+                <a:t>i</a:t>
+              </a:r>
+              <a:endParaRPr lang="fr-FR" sz="1600" baseline="-25000" dirty="0"/>
+            </a:p>
+          </p:txBody>
+        </p:sp>
+      </p:grpSp>
+      <p:sp>
+        <p:nvSpPr>
+          <p:cNvPr id="43" name="ZoneTexte 42"/>
+          <p:cNvSpPr txBox="1"/>
+          <p:nvPr/>
+        </p:nvSpPr>
+        <p:spPr>
+          <a:xfrm>
+            <a:off x="7623866" y="5981516"/>
+            <a:ext cx="1241558" cy="338554"/>
+          </a:xfrm>
+          <a:prstGeom prst="rect">
+            <a:avLst/>
+          </a:prstGeom>
+          <a:noFill/>
+        </p:spPr>
+        <p:txBody>
+          <a:bodyPr wrap="none" rtlCol="0">
+            <a:spAutoFit/>
+          </a:bodyPr>
+          <a:lstStyle/>
+          <a:p>
+            <a:r>
+              <a:rPr lang="fr-FR" sz="1600" i="1" dirty="0" smtClean="0"/>
+              <a:t>reset </a:t>
+            </a:r>
+            <a:r>
+              <a:rPr lang="fr-FR" sz="1600" i="1" dirty="0" err="1" smtClean="0"/>
+              <a:t>clock</a:t>
+            </a:r>
+            <a:r>
+              <a:rPr lang="fr-FR" sz="1600" i="1" dirty="0" smtClean="0"/>
+              <a:t> x </a:t>
+            </a:r>
+          </a:p>
+        </p:txBody>
+      </p:sp>
+      <p:cxnSp>
+        <p:nvCxnSpPr>
+          <p:cNvPr id="44" name="Connecteur droit 43"/>
+          <p:cNvCxnSpPr/>
+          <p:nvPr/>
+        </p:nvCxnSpPr>
+        <p:spPr>
+          <a:xfrm>
+            <a:off x="6610858" y="5493399"/>
+            <a:ext cx="4870383" cy="0"/>
+          </a:xfrm>
+          <a:prstGeom prst="line">
+            <a:avLst/>
+          </a:prstGeom>
+          <a:noFill/>
+          <a:ln w="3175">
+            <a:solidFill>
+              <a:srgbClr val="92D050"/>
+            </a:solidFill>
+            <a:headEnd type="none" w="med" len="med"/>
+            <a:tailEnd type="arrow" w="med" len="med"/>
+          </a:ln>
+        </p:spPr>
+        <p:style>
+          <a:lnRef idx="2">
+            <a:schemeClr val="accent1">
+              <a:shade val="50000"/>
+            </a:schemeClr>
+          </a:lnRef>
+          <a:fillRef idx="1">
+            <a:schemeClr val="accent1"/>
+          </a:fillRef>
+          <a:effectRef idx="0">
+            <a:schemeClr val="accent1"/>
+          </a:effectRef>
+          <a:fontRef idx="minor">
+            <a:schemeClr val="lt1"/>
+          </a:fontRef>
+        </p:style>
+      </p:cxnSp>
+      <p:sp>
+        <p:nvSpPr>
+          <p:cNvPr id="45" name="ZoneTexte 44"/>
+          <p:cNvSpPr txBox="1"/>
+          <p:nvPr/>
+        </p:nvSpPr>
+        <p:spPr>
+          <a:xfrm>
+            <a:off x="9167370" y="5981516"/>
+            <a:ext cx="1253869" cy="338554"/>
+          </a:xfrm>
+          <a:prstGeom prst="rect">
+            <a:avLst/>
+          </a:prstGeom>
+          <a:noFill/>
+        </p:spPr>
+        <p:txBody>
+          <a:bodyPr wrap="none" rtlCol="0">
+            <a:spAutoFit/>
+          </a:bodyPr>
+          <a:lstStyle/>
+          <a:p>
+            <a:r>
+              <a:rPr lang="fr-FR" sz="1600" i="1" dirty="0"/>
+              <a:t>d</a:t>
+            </a:r>
+            <a:r>
+              <a:rPr lang="fr-FR" sz="1600" i="1" baseline="-25000" dirty="0" smtClean="0"/>
+              <a:t>1</a:t>
+            </a:r>
+            <a:r>
+              <a:rPr lang="fr-FR" sz="1600" i="1" dirty="0" smtClean="0"/>
+              <a:t> &lt;= x &lt;= d</a:t>
+            </a:r>
+            <a:r>
+              <a:rPr lang="fr-FR" sz="1600" i="1" baseline="-25000" dirty="0" smtClean="0"/>
+              <a:t>2</a:t>
+            </a:r>
+            <a:endParaRPr lang="fr-FR" sz="1600" i="1" baseline="-25000" dirty="0"/>
+          </a:p>
+        </p:txBody>
+      </p:sp>
+      <p:sp>
+        <p:nvSpPr>
+          <p:cNvPr id="48" name="Rectangle 47"/>
+          <p:cNvSpPr/>
+          <p:nvPr/>
+        </p:nvSpPr>
+        <p:spPr>
+          <a:xfrm>
+            <a:off x="7843735" y="5612184"/>
+            <a:ext cx="801823" cy="369332"/>
+          </a:xfrm>
+          <a:prstGeom prst="rect">
+            <a:avLst/>
+          </a:prstGeom>
+        </p:spPr>
+        <p:txBody>
+          <a:bodyPr wrap="none">
+            <a:spAutoFit/>
+          </a:bodyPr>
+          <a:lstStyle/>
+          <a:p>
+            <a:pPr algn="ctr"/>
+            <a:r>
+              <a:rPr lang="fr-FR" dirty="0" err="1" smtClean="0"/>
+              <a:t>action</a:t>
+            </a:r>
+            <a:r>
+              <a:rPr lang="fr-FR" baseline="-25000" dirty="0" err="1" smtClean="0"/>
+              <a:t>i</a:t>
+            </a:r>
+            <a:endParaRPr lang="fr-FR" baseline="-25000" dirty="0"/>
+          </a:p>
+        </p:txBody>
+      </p:sp>
+      <p:sp>
+        <p:nvSpPr>
+          <p:cNvPr id="49" name="Rectangle 48"/>
+          <p:cNvSpPr/>
+          <p:nvPr/>
+        </p:nvSpPr>
+        <p:spPr>
+          <a:xfrm>
+            <a:off x="9322417" y="5612184"/>
+            <a:ext cx="843693" cy="369332"/>
+          </a:xfrm>
+          <a:prstGeom prst="rect">
+            <a:avLst/>
+          </a:prstGeom>
+        </p:spPr>
+        <p:txBody>
+          <a:bodyPr wrap="none">
+            <a:spAutoFit/>
+          </a:bodyPr>
+          <a:lstStyle/>
+          <a:p>
+            <a:r>
+              <a:rPr lang="fr-FR" dirty="0" err="1" smtClean="0"/>
+              <a:t>trigger</a:t>
+            </a:r>
+            <a:r>
+              <a:rPr lang="fr-FR" baseline="-25000" dirty="0" err="1" smtClean="0"/>
+              <a:t>j</a:t>
+            </a:r>
+            <a:endParaRPr lang="fr-FR" dirty="0"/>
+          </a:p>
+        </p:txBody>
+      </p:sp>
+      <p:sp>
+        <p:nvSpPr>
+          <p:cNvPr id="50" name="Rectangle 49"/>
+          <p:cNvSpPr/>
+          <p:nvPr/>
+        </p:nvSpPr>
+        <p:spPr>
+          <a:xfrm>
+            <a:off x="11038784" y="5061343"/>
+            <a:ext cx="607859" cy="369332"/>
+          </a:xfrm>
+          <a:prstGeom prst="rect">
+            <a:avLst/>
+          </a:prstGeom>
+        </p:spPr>
+        <p:txBody>
+          <a:bodyPr wrap="none">
+            <a:spAutoFit/>
+          </a:bodyPr>
+          <a:lstStyle/>
+          <a:p>
+            <a:r>
+              <a:rPr lang="fr-FR" i="1" dirty="0">
+                <a:solidFill>
+                  <a:srgbClr val="92D050"/>
+                </a:solidFill>
+              </a:rPr>
+              <a:t>time</a:t>
+            </a:r>
+            <a:endParaRPr lang="fr-FR" dirty="0"/>
+          </a:p>
+        </p:txBody>
+      </p:sp>
+      <p:cxnSp>
+        <p:nvCxnSpPr>
+          <p:cNvPr id="51" name="Connecteur droit 50"/>
+          <p:cNvCxnSpPr/>
+          <p:nvPr/>
+        </p:nvCxnSpPr>
+        <p:spPr>
+          <a:xfrm>
+            <a:off x="9738808" y="5289396"/>
+            <a:ext cx="0" cy="380451"/>
+          </a:xfrm>
+          <a:prstGeom prst="line">
+            <a:avLst/>
+          </a:prstGeom>
+          <a:noFill/>
+          <a:ln w="3175">
+            <a:solidFill>
+              <a:srgbClr val="92D050"/>
+            </a:solidFill>
+          </a:ln>
+        </p:spPr>
+        <p:style>
+          <a:lnRef idx="2">
+            <a:schemeClr val="accent1">
+              <a:shade val="50000"/>
+            </a:schemeClr>
+          </a:lnRef>
+          <a:fillRef idx="1">
+            <a:schemeClr val="accent1"/>
+          </a:fillRef>
+          <a:effectRef idx="0">
+            <a:schemeClr val="accent1"/>
+          </a:effectRef>
+          <a:fontRef idx="minor">
+            <a:schemeClr val="lt1"/>
+          </a:fontRef>
+        </p:style>
+      </p:cxnSp>
+      <p:cxnSp>
+        <p:nvCxnSpPr>
+          <p:cNvPr id="3" name="Connecteur droit 2"/>
+          <p:cNvCxnSpPr/>
+          <p:nvPr/>
+        </p:nvCxnSpPr>
+        <p:spPr>
+          <a:xfrm>
+            <a:off x="2968892" y="5481475"/>
+            <a:ext cx="1253869" cy="0"/>
+          </a:xfrm>
+          <a:prstGeom prst="line">
+            <a:avLst/>
+          </a:prstGeom>
+          <a:noFill/>
           <a:ln w="28575">
             <a:solidFill>
               <a:srgbClr val="92D050"/>
@@ -4314,39 +4904,44 @@
           </a:fontRef>
         </p:style>
       </p:cxnSp>
-      <p:sp>
-        <p:nvSpPr>
-          <p:cNvPr id="40" name="Rectangle 39"/>
-          <p:cNvSpPr/>
+      <p:cxnSp>
+        <p:nvCxnSpPr>
+          <p:cNvPr id="52" name="Connecteur droit 51"/>
+          <p:cNvCxnSpPr/>
           <p:nvPr/>
-        </p:nvSpPr>
+        </p:nvCxnSpPr>
         <p:spPr>
           <a:xfrm>
-            <a:off x="4739700" y="2440372"/>
-            <a:ext cx="801823" cy="369332"/>
-          </a:xfrm>
-          <a:prstGeom prst="rect">
+            <a:off x="9109119" y="5493399"/>
+            <a:ext cx="1253869" cy="0"/>
+          </a:xfrm>
+          <a:prstGeom prst="line">
             <a:avLst/>
           </a:prstGeom>
+          <a:noFill/>
+          <a:ln w="28575">
+            <a:solidFill>
+              <a:srgbClr val="92D050"/>
+            </a:solidFill>
+          </a:ln>
         </p:spPr>
-        <p:txBody>
-          <a:bodyPr wrap="none">
-            <a:spAutoFit/>
-          </a:bodyPr>
-          <a:lstStyle/>
-          <a:p>
-            <a:r>
-              <a:rPr lang="fr-FR" dirty="0" err="1" smtClean="0"/>
-              <a:t>action</a:t>
-            </a:r>
-            <a:r>
-              <a:rPr lang="fr-FR" baseline="-25000" dirty="0" err="1" smtClean="0"/>
-              <a:t>j</a:t>
-            </a:r>
-            <a:endParaRPr lang="fr-FR" dirty="0"/>
-          </a:p>
-        </p:txBody>
-      </p:sp>
+        <p:style>
+          <a:lnRef idx="2">
+            <a:schemeClr val="accent1">
+              <a:shade val="50000"/>
+            </a:schemeClr>
+          </a:lnRef>
+          <a:fillRef idx="1">
+            <a:schemeClr val="accent1"/>
+          </a:fillRef>
+          <a:effectRef idx="0">
+            <a:schemeClr val="accent1"/>
+          </a:effectRef>
+          <a:fontRef idx="minor">
+            <a:schemeClr val="lt1"/>
+          </a:fontRef>
+        </p:style>
+      </p:cxnSp>
     </p:spTree>
     <p:extLst>
       <p:ext uri="{BB962C8B-B14F-4D97-AF65-F5344CB8AC3E}">

</xml_diff>